<commit_message>
bme844 hw8 preliminary results
</commit_message>
<xml_diff>
--- a/bme844_adv_ultrasound/hw7_ppt.pptx
+++ b/bme844_adv_ultrasound/hw7_ppt.pptx
@@ -4201,11 +4201,7 @@
             </a:r>
             <a:r>
               <a:rPr lang="en-US" dirty="0" smtClean="0"/>
-              <a:t> model, more simplified models used for form factor analysis include fluid sphere, spherical shell, and </a:t>
-            </a:r>
-            <a:r>
-              <a:rPr lang="en-US" smtClean="0"/>
-              <a:t>Gaussian models</a:t>
+              <a:t> model, more simplified models used for form factor analysis include fluid sphere, spherical shell, and Gaussian models</a:t>
             </a:r>
             <a:endParaRPr lang="en-US" dirty="0" smtClean="0"/>
           </a:p>

</xml_diff>